<commit_message>
add example for look-around
</commit_message>
<xml_diff>
--- a/regex/Regular Expression.pptx
+++ b/regex/Regular Expression.pptx
@@ -312,7 +312,7 @@
             <a:fld id="{530820CF-B880-4189-942D-D702A7CBA730}" type="datetimeFigureOut">
               <a:rPr lang="zh-CN" altLang="en-US" smtClean="0"/>
               <a:pPr/>
-              <a:t>2012/3/26</a:t>
+              <a:t>2012/3/28</a:t>
             </a:fld>
             <a:endParaRPr lang="zh-CN" altLang="en-US"/>
           </a:p>
@@ -479,7 +479,7 @@
             <a:fld id="{530820CF-B880-4189-942D-D702A7CBA730}" type="datetimeFigureOut">
               <a:rPr lang="zh-CN" altLang="en-US" smtClean="0"/>
               <a:pPr/>
-              <a:t>2012/3/26</a:t>
+              <a:t>2012/3/28</a:t>
             </a:fld>
             <a:endParaRPr lang="zh-CN" altLang="en-US"/>
           </a:p>
@@ -656,7 +656,7 @@
             <a:fld id="{530820CF-B880-4189-942D-D702A7CBA730}" type="datetimeFigureOut">
               <a:rPr lang="zh-CN" altLang="en-US" smtClean="0"/>
               <a:pPr/>
-              <a:t>2012/3/26</a:t>
+              <a:t>2012/3/28</a:t>
             </a:fld>
             <a:endParaRPr lang="zh-CN" altLang="en-US"/>
           </a:p>
@@ -823,7 +823,7 @@
             <a:fld id="{530820CF-B880-4189-942D-D702A7CBA730}" type="datetimeFigureOut">
               <a:rPr lang="zh-CN" altLang="en-US" smtClean="0"/>
               <a:pPr/>
-              <a:t>2012/3/26</a:t>
+              <a:t>2012/3/28</a:t>
             </a:fld>
             <a:endParaRPr lang="zh-CN" altLang="en-US"/>
           </a:p>
@@ -1066,7 +1066,7 @@
             <a:fld id="{530820CF-B880-4189-942D-D702A7CBA730}" type="datetimeFigureOut">
               <a:rPr lang="zh-CN" altLang="en-US" smtClean="0"/>
               <a:pPr/>
-              <a:t>2012/3/26</a:t>
+              <a:t>2012/3/28</a:t>
             </a:fld>
             <a:endParaRPr lang="zh-CN" altLang="en-US"/>
           </a:p>
@@ -1351,7 +1351,7 @@
             <a:fld id="{530820CF-B880-4189-942D-D702A7CBA730}" type="datetimeFigureOut">
               <a:rPr lang="zh-CN" altLang="en-US" smtClean="0"/>
               <a:pPr/>
-              <a:t>2012/3/26</a:t>
+              <a:t>2012/3/28</a:t>
             </a:fld>
             <a:endParaRPr lang="zh-CN" altLang="en-US"/>
           </a:p>
@@ -1770,7 +1770,7 @@
             <a:fld id="{530820CF-B880-4189-942D-D702A7CBA730}" type="datetimeFigureOut">
               <a:rPr lang="zh-CN" altLang="en-US" smtClean="0"/>
               <a:pPr/>
-              <a:t>2012/3/26</a:t>
+              <a:t>2012/3/28</a:t>
             </a:fld>
             <a:endParaRPr lang="zh-CN" altLang="en-US"/>
           </a:p>
@@ -1885,7 +1885,7 @@
             <a:fld id="{530820CF-B880-4189-942D-D702A7CBA730}" type="datetimeFigureOut">
               <a:rPr lang="zh-CN" altLang="en-US" smtClean="0"/>
               <a:pPr/>
-              <a:t>2012/3/26</a:t>
+              <a:t>2012/3/28</a:t>
             </a:fld>
             <a:endParaRPr lang="zh-CN" altLang="en-US"/>
           </a:p>
@@ -1977,7 +1977,7 @@
             <a:fld id="{530820CF-B880-4189-942D-D702A7CBA730}" type="datetimeFigureOut">
               <a:rPr lang="zh-CN" altLang="en-US" smtClean="0"/>
               <a:pPr/>
-              <a:t>2012/3/26</a:t>
+              <a:t>2012/3/28</a:t>
             </a:fld>
             <a:endParaRPr lang="zh-CN" altLang="en-US"/>
           </a:p>
@@ -2251,7 +2251,7 @@
             <a:fld id="{530820CF-B880-4189-942D-D702A7CBA730}" type="datetimeFigureOut">
               <a:rPr lang="zh-CN" altLang="en-US" smtClean="0"/>
               <a:pPr/>
-              <a:t>2012/3/26</a:t>
+              <a:t>2012/3/28</a:t>
             </a:fld>
             <a:endParaRPr lang="zh-CN" altLang="en-US"/>
           </a:p>
@@ -2501,7 +2501,7 @@
             <a:fld id="{530820CF-B880-4189-942D-D702A7CBA730}" type="datetimeFigureOut">
               <a:rPr lang="zh-CN" altLang="en-US" smtClean="0"/>
               <a:pPr/>
-              <a:t>2012/3/26</a:t>
+              <a:t>2012/3/28</a:t>
             </a:fld>
             <a:endParaRPr lang="zh-CN" altLang="en-US"/>
           </a:p>
@@ -2711,7 +2711,7 @@
             <a:fld id="{530820CF-B880-4189-942D-D702A7CBA730}" type="datetimeFigureOut">
               <a:rPr lang="zh-CN" altLang="en-US" smtClean="0"/>
               <a:pPr/>
-              <a:t>2012/3/26</a:t>
+              <a:t>2012/3/28</a:t>
             </a:fld>
             <a:endParaRPr lang="zh-CN" altLang="en-US"/>
           </a:p>
@@ -4418,7 +4418,42 @@
                   <a:srgbClr val="0070C0"/>
                 </a:solidFill>
               </a:rPr>
-              <a:t> "Ruby"&gt;</a:t>
+              <a:t> "Ruby</a:t>
+            </a:r>
+            <a:r>
+              <a:rPr lang="en-US" altLang="zh-CN" dirty="0" smtClean="0">
+                <a:solidFill>
+                  <a:srgbClr val="0070C0"/>
+                </a:solidFill>
+              </a:rPr>
+              <a:t>"&gt;</a:t>
+            </a:r>
+          </a:p>
+          <a:p>
+            <a:pPr lvl="1"/>
+            <a:r>
+              <a:rPr lang="en-US" altLang="zh-CN" dirty="0" smtClean="0">
+                <a:solidFill>
+                  <a:srgbClr val="0070C0"/>
+                </a:solidFill>
+              </a:rPr>
+              <a:t> "</a:t>
+            </a:r>
+            <a:r>
+              <a:rPr lang="en-US" altLang="zh-CN" dirty="0" err="1" smtClean="0">
+                <a:solidFill>
+                  <a:srgbClr val="0070C0"/>
+                </a:solidFill>
+              </a:rPr>
+              <a:t>Jeffs".gsub</a:t>
+            </a:r>
+            <a:r>
+              <a:rPr lang="en-US" altLang="zh-CN" dirty="0" smtClean="0">
+                <a:solidFill>
+                  <a:srgbClr val="0070C0"/>
+                </a:solidFill>
+              </a:rPr>
+              <a:t>(/(?&lt;=Jeff)(?=s)/, "'")</a:t>
             </a:r>
             <a:endParaRPr lang="zh-CN" altLang="en-US" dirty="0">
               <a:solidFill>
@@ -5693,7 +5728,7 @@
     </p:spTree>
     <p:extLst>
       <p:ext uri="{BB962C8B-B14F-4D97-AF65-F5344CB8AC3E}">
-        <p14:creationId xmlns:p14="http://schemas.microsoft.com/office/powerpoint/2010/main" xmlns="" val="3694188506"/>
+        <p14:creationId xmlns="" xmlns:p14="http://schemas.microsoft.com/office/powerpoint/2010/main" val="3694188506"/>
       </p:ext>
     </p:extLst>
   </p:cSld>
@@ -5832,7 +5867,7 @@
     </p:spTree>
     <p:extLst>
       <p:ext uri="{BB962C8B-B14F-4D97-AF65-F5344CB8AC3E}">
-        <p14:creationId xmlns:p14="http://schemas.microsoft.com/office/powerpoint/2010/main" xmlns="" val="4207488348"/>
+        <p14:creationId xmlns="" xmlns:p14="http://schemas.microsoft.com/office/powerpoint/2010/main" val="4207488348"/>
       </p:ext>
     </p:extLst>
   </p:cSld>
@@ -5964,7 +5999,7 @@
     </p:spTree>
     <p:extLst>
       <p:ext uri="{BB962C8B-B14F-4D97-AF65-F5344CB8AC3E}">
-        <p14:creationId xmlns:p14="http://schemas.microsoft.com/office/powerpoint/2010/main" xmlns="" val="382312730"/>
+        <p14:creationId xmlns="" xmlns:p14="http://schemas.microsoft.com/office/powerpoint/2010/main" val="382312730"/>
       </p:ext>
     </p:extLst>
   </p:cSld>
@@ -6502,35 +6537,39 @@
         </p:nvSpPr>
         <p:spPr/>
         <p:txBody>
-          <a:bodyPr/>
-          <a:lstStyle/>
-          <a:p>
-            <a:r>
-              <a:rPr lang="en-US" altLang="zh-CN" dirty="0" smtClean="0"/>
-              <a:t>Nondeterministic </a:t>
-            </a:r>
-            <a:r>
-              <a:rPr lang="en-US" altLang="zh-CN" dirty="0" smtClean="0"/>
-              <a:t>Finite </a:t>
-            </a:r>
-            <a:r>
-              <a:rPr lang="en-US" altLang="zh-CN" dirty="0" smtClean="0"/>
-              <a:t>Automaton</a:t>
-            </a:r>
-          </a:p>
-          <a:p>
-            <a:r>
-              <a:rPr lang="en-US" altLang="zh-CN" dirty="0" smtClean="0"/>
-              <a:t>Deterministic </a:t>
-            </a:r>
-            <a:r>
-              <a:rPr lang="en-US" altLang="zh-CN" dirty="0" smtClean="0"/>
-              <a:t>Finite </a:t>
-            </a:r>
-            <a:r>
-              <a:rPr lang="en-US" altLang="zh-CN" dirty="0" smtClean="0"/>
-              <a:t>Automaton</a:t>
-            </a:r>
+          <a:bodyPr>
+            <a:normAutofit/>
+          </a:bodyPr>
+          <a:lstStyle/>
+          <a:p>
+            <a:r>
+              <a:rPr lang="en-US" altLang="zh-CN" sz="2800" dirty="0" smtClean="0"/>
+              <a:t>Nondeterministic Finite </a:t>
+            </a:r>
+            <a:r>
+              <a:rPr lang="en-US" altLang="zh-CN" sz="2800" dirty="0" smtClean="0"/>
+              <a:t>Automaton(</a:t>
+            </a:r>
+            <a:r>
+              <a:rPr lang="en-US" altLang="zh-CN" sz="2800" dirty="0" err="1" smtClean="0"/>
+              <a:t>regex</a:t>
+            </a:r>
+            <a:r>
+              <a:rPr lang="en-US" altLang="zh-CN" sz="2800" dirty="0" smtClean="0"/>
+              <a:t>-directed)</a:t>
+            </a:r>
+            <a:endParaRPr lang="en-US" altLang="zh-CN" sz="2800" dirty="0" smtClean="0"/>
+          </a:p>
+          <a:p>
+            <a:r>
+              <a:rPr lang="en-US" altLang="zh-CN" sz="2800" dirty="0" smtClean="0"/>
+              <a:t>Deterministic Finite </a:t>
+            </a:r>
+            <a:r>
+              <a:rPr lang="en-US" altLang="zh-CN" sz="2800" dirty="0" smtClean="0"/>
+              <a:t>Automaton(text-directed)</a:t>
+            </a:r>
+            <a:endParaRPr lang="en-US" altLang="zh-CN" sz="2800" dirty="0" smtClean="0"/>
           </a:p>
           <a:p>
             <a:pPr lvl="1"/>
@@ -6560,15 +6599,15 @@
             </a:r>
             <a:r>
               <a:rPr lang="en-US" altLang="zh-CN" dirty="0" smtClean="0"/>
-              <a:t>*not</a:t>
+              <a:t>\*</a:t>
             </a:r>
             <a:r>
               <a:rPr lang="en-US" altLang="zh-CN" dirty="0" smtClean="0"/>
-              <a:t>/</a:t>
-            </a:r>
-          </a:p>
-          <a:p>
-            <a:endParaRPr lang="zh-CN" altLang="en-US" dirty="0"/>
+              <a:t>not/</a:t>
+            </a:r>
+          </a:p>
+          <a:p>
+            <a:endParaRPr lang="zh-CN" altLang="en-US" sz="2800" dirty="0"/>
           </a:p>
         </p:txBody>
       </p:sp>
@@ -6581,7 +6620,7 @@
           <p:nvPr/>
         </p:nvGraphicFramePr>
         <p:xfrm>
-          <a:off x="500034" y="3500437"/>
+          <a:off x="500034" y="3357562"/>
           <a:ext cx="7858180" cy="2618427"/>
         </p:xfrm>
         <a:graphic>

</xml_diff>